<commit_message>
Added new notebooks on functional iteration patterns
</commit_message>
<xml_diff>
--- a/img/notebook_images.pptx
+++ b/img/notebook_images.pptx
@@ -6,6 +6,7 @@
   </p:sldMasterIdLst>
   <p:sldIdLst>
     <p:sldId id="256" r:id="rId2"/>
+    <p:sldId id="257" r:id="rId3"/>
   </p:sldIdLst>
   <p:sldSz cx="12192000" cy="6858000"/>
   <p:notesSz cx="6858000" cy="9144000"/>
@@ -104,6 +105,11 @@
       </a:defRPr>
     </a:lvl9pPr>
   </p:defaultTextStyle>
+  <p:extLst>
+    <p:ext uri="{EFAFB233-063F-42B5-8137-9DF3F51BA10A}">
+      <p15:sldGuideLst xmlns:p15="http://schemas.microsoft.com/office/powerpoint/2012/main"/>
+    </p:ext>
+  </p:extLst>
 </p:presentation>
 </file>
 
@@ -238,7 +244,7 @@
           <a:p>
             <a:fld id="{ACB9F59A-1855-AD4C-8B2D-B9BAC0129B51}" type="datetimeFigureOut">
               <a:rPr lang="en-US" smtClean="0"/>
-              <a:t>10/9/24</a:t>
+              <a:t>10/31/24</a:t>
             </a:fld>
             <a:endParaRPr lang="en-US"/>
           </a:p>
@@ -408,7 +414,7 @@
           <a:p>
             <a:fld id="{ACB9F59A-1855-AD4C-8B2D-B9BAC0129B51}" type="datetimeFigureOut">
               <a:rPr lang="en-US" smtClean="0"/>
-              <a:t>10/9/24</a:t>
+              <a:t>10/31/24</a:t>
             </a:fld>
             <a:endParaRPr lang="en-US"/>
           </a:p>
@@ -588,7 +594,7 @@
           <a:p>
             <a:fld id="{ACB9F59A-1855-AD4C-8B2D-B9BAC0129B51}" type="datetimeFigureOut">
               <a:rPr lang="en-US" smtClean="0"/>
-              <a:t>10/9/24</a:t>
+              <a:t>10/31/24</a:t>
             </a:fld>
             <a:endParaRPr lang="en-US"/>
           </a:p>
@@ -758,7 +764,7 @@
           <a:p>
             <a:fld id="{ACB9F59A-1855-AD4C-8B2D-B9BAC0129B51}" type="datetimeFigureOut">
               <a:rPr lang="en-US" smtClean="0"/>
-              <a:t>10/9/24</a:t>
+              <a:t>10/31/24</a:t>
             </a:fld>
             <a:endParaRPr lang="en-US"/>
           </a:p>
@@ -1004,7 +1010,7 @@
           <a:p>
             <a:fld id="{ACB9F59A-1855-AD4C-8B2D-B9BAC0129B51}" type="datetimeFigureOut">
               <a:rPr lang="en-US" smtClean="0"/>
-              <a:t>10/9/24</a:t>
+              <a:t>10/31/24</a:t>
             </a:fld>
             <a:endParaRPr lang="en-US"/>
           </a:p>
@@ -1236,7 +1242,7 @@
           <a:p>
             <a:fld id="{ACB9F59A-1855-AD4C-8B2D-B9BAC0129B51}" type="datetimeFigureOut">
               <a:rPr lang="en-US" smtClean="0"/>
-              <a:t>10/9/24</a:t>
+              <a:t>10/31/24</a:t>
             </a:fld>
             <a:endParaRPr lang="en-US"/>
           </a:p>
@@ -1603,7 +1609,7 @@
           <a:p>
             <a:fld id="{ACB9F59A-1855-AD4C-8B2D-B9BAC0129B51}" type="datetimeFigureOut">
               <a:rPr lang="en-US" smtClean="0"/>
-              <a:t>10/9/24</a:t>
+              <a:t>10/31/24</a:t>
             </a:fld>
             <a:endParaRPr lang="en-US"/>
           </a:p>
@@ -1721,7 +1727,7 @@
           <a:p>
             <a:fld id="{ACB9F59A-1855-AD4C-8B2D-B9BAC0129B51}" type="datetimeFigureOut">
               <a:rPr lang="en-US" smtClean="0"/>
-              <a:t>10/9/24</a:t>
+              <a:t>10/31/24</a:t>
             </a:fld>
             <a:endParaRPr lang="en-US"/>
           </a:p>
@@ -1816,7 +1822,7 @@
           <a:p>
             <a:fld id="{ACB9F59A-1855-AD4C-8B2D-B9BAC0129B51}" type="datetimeFigureOut">
               <a:rPr lang="en-US" smtClean="0"/>
-              <a:t>10/9/24</a:t>
+              <a:t>10/31/24</a:t>
             </a:fld>
             <a:endParaRPr lang="en-US"/>
           </a:p>
@@ -2093,7 +2099,7 @@
           <a:p>
             <a:fld id="{ACB9F59A-1855-AD4C-8B2D-B9BAC0129B51}" type="datetimeFigureOut">
               <a:rPr lang="en-US" smtClean="0"/>
-              <a:t>10/9/24</a:t>
+              <a:t>10/31/24</a:t>
             </a:fld>
             <a:endParaRPr lang="en-US"/>
           </a:p>
@@ -2350,7 +2356,7 @@
           <a:p>
             <a:fld id="{ACB9F59A-1855-AD4C-8B2D-B9BAC0129B51}" type="datetimeFigureOut">
               <a:rPr lang="en-US" smtClean="0"/>
-              <a:t>10/9/24</a:t>
+              <a:t>10/31/24</a:t>
             </a:fld>
             <a:endParaRPr lang="en-US"/>
           </a:p>
@@ -2563,7 +2569,7 @@
           <a:p>
             <a:fld id="{ACB9F59A-1855-AD4C-8B2D-B9BAC0129B51}" type="datetimeFigureOut">
               <a:rPr lang="en-US" smtClean="0"/>
-              <a:t>10/9/24</a:t>
+              <a:t>10/31/24</a:t>
             </a:fld>
             <a:endParaRPr lang="en-US"/>
           </a:p>
@@ -3495,6 +3501,436 @@
 </p:sld>
 </file>
 
+<file path=ppt/slides/slide2.xml><?xml version="1.0" encoding="utf-8"?>
+<p:sld xmlns:a="http://schemas.openxmlformats.org/drawingml/2006/main" xmlns:r="http://schemas.openxmlformats.org/officeDocument/2006/relationships" xmlns:p="http://schemas.openxmlformats.org/presentationml/2006/main">
+  <p:cSld>
+    <p:spTree>
+      <p:nvGrpSpPr>
+        <p:cNvPr id="1" name=""/>
+        <p:cNvGrpSpPr/>
+        <p:nvPr/>
+      </p:nvGrpSpPr>
+      <p:grpSpPr>
+        <a:xfrm>
+          <a:off x="0" y="0"/>
+          <a:ext cx="0" cy="0"/>
+          <a:chOff x="0" y="0"/>
+          <a:chExt cx="0" cy="0"/>
+        </a:xfrm>
+      </p:grpSpPr>
+      <p:pic>
+        <p:nvPicPr>
+          <p:cNvPr id="2" name="Picture 1">
+            <a:extLst>
+              <a:ext uri="{FF2B5EF4-FFF2-40B4-BE49-F238E27FC236}">
+                <a16:creationId xmlns:a16="http://schemas.microsoft.com/office/drawing/2014/main" id="{C8CE5066-D57C-31F9-B450-3A88E575C39E}"/>
+              </a:ext>
+            </a:extLst>
+          </p:cNvPr>
+          <p:cNvPicPr>
+            <a:picLocks noChangeAspect="1"/>
+          </p:cNvPicPr>
+          <p:nvPr/>
+        </p:nvPicPr>
+        <p:blipFill>
+          <a:blip r:embed="rId2"/>
+          <a:stretch>
+            <a:fillRect/>
+          </a:stretch>
+        </p:blipFill>
+        <p:spPr>
+          <a:xfrm>
+            <a:off x="883023" y="1633429"/>
+            <a:ext cx="10425953" cy="1462118"/>
+          </a:xfrm>
+          <a:prstGeom prst="rect">
+            <a:avLst/>
+          </a:prstGeom>
+        </p:spPr>
+      </p:pic>
+      <p:cxnSp>
+        <p:nvCxnSpPr>
+          <p:cNvPr id="4" name="Straight Arrow Connector 3">
+            <a:extLst>
+              <a:ext uri="{FF2B5EF4-FFF2-40B4-BE49-F238E27FC236}">
+                <a16:creationId xmlns:a16="http://schemas.microsoft.com/office/drawing/2014/main" id="{1B9020B7-4312-B6A5-A73A-02CE80639285}"/>
+              </a:ext>
+            </a:extLst>
+          </p:cNvPr>
+          <p:cNvCxnSpPr>
+            <a:cxnSpLocks/>
+            <a:stCxn id="5" idx="3"/>
+          </p:cNvCxnSpPr>
+          <p:nvPr/>
+        </p:nvCxnSpPr>
+        <p:spPr>
+          <a:xfrm flipV="1">
+            <a:off x="2255637" y="2645959"/>
+            <a:ext cx="1238589" cy="772754"/>
+          </a:xfrm>
+          <a:prstGeom prst="straightConnector1">
+            <a:avLst/>
+          </a:prstGeom>
+          <a:ln w="38100">
+            <a:solidFill>
+              <a:schemeClr val="accent2"/>
+            </a:solidFill>
+            <a:tailEnd type="triangle"/>
+          </a:ln>
+        </p:spPr>
+        <p:style>
+          <a:lnRef idx="1">
+            <a:schemeClr val="accent1"/>
+          </a:lnRef>
+          <a:fillRef idx="0">
+            <a:schemeClr val="accent1"/>
+          </a:fillRef>
+          <a:effectRef idx="0">
+            <a:schemeClr val="accent1"/>
+          </a:effectRef>
+          <a:fontRef idx="minor">
+            <a:schemeClr val="tx1"/>
+          </a:fontRef>
+        </p:style>
+      </p:cxnSp>
+      <p:sp>
+        <p:nvSpPr>
+          <p:cNvPr id="5" name="TextBox 4">
+            <a:extLst>
+              <a:ext uri="{FF2B5EF4-FFF2-40B4-BE49-F238E27FC236}">
+                <a16:creationId xmlns:a16="http://schemas.microsoft.com/office/drawing/2014/main" id="{1DD3C912-E2A6-4E69-6B1A-0386CF5F3518}"/>
+              </a:ext>
+            </a:extLst>
+          </p:cNvPr>
+          <p:cNvSpPr txBox="1"/>
+          <p:nvPr/>
+        </p:nvSpPr>
+        <p:spPr>
+          <a:xfrm>
+            <a:off x="1471448" y="3095547"/>
+            <a:ext cx="784189" cy="646331"/>
+          </a:xfrm>
+          <a:prstGeom prst="rect">
+            <a:avLst/>
+          </a:prstGeom>
+          <a:noFill/>
+        </p:spPr>
+        <p:txBody>
+          <a:bodyPr wrap="none" rtlCol="0">
+            <a:spAutoFit/>
+          </a:bodyPr>
+          <a:lstStyle/>
+          <a:p>
+            <a:r>
+              <a:rPr lang="en-US" b="1" dirty="0">
+                <a:solidFill>
+                  <a:schemeClr val="accent2"/>
+                </a:solidFill>
+              </a:rPr>
+              <a:t>Initial </a:t>
+            </a:r>
+          </a:p>
+          <a:p>
+            <a:r>
+              <a:rPr lang="en-US" b="1" dirty="0">
+                <a:solidFill>
+                  <a:schemeClr val="accent2"/>
+                </a:solidFill>
+              </a:rPr>
+              <a:t>Value</a:t>
+            </a:r>
+          </a:p>
+        </p:txBody>
+      </p:sp>
+      <p:sp>
+        <p:nvSpPr>
+          <p:cNvPr id="7" name="Right Brace 6">
+            <a:extLst>
+              <a:ext uri="{FF2B5EF4-FFF2-40B4-BE49-F238E27FC236}">
+                <a16:creationId xmlns:a16="http://schemas.microsoft.com/office/drawing/2014/main" id="{E11560AB-F01A-4BBD-8531-57FCBFCA0B98}"/>
+              </a:ext>
+            </a:extLst>
+          </p:cNvPr>
+          <p:cNvSpPr/>
+          <p:nvPr/>
+        </p:nvSpPr>
+        <p:spPr>
+          <a:xfrm rot="5400000">
+            <a:off x="4609757" y="1551443"/>
+            <a:ext cx="1095919" cy="3284951"/>
+          </a:xfrm>
+          <a:prstGeom prst="rightBrace">
+            <a:avLst/>
+          </a:prstGeom>
+          <a:ln w="38100">
+            <a:solidFill>
+              <a:srgbClr val="00B0F0"/>
+            </a:solidFill>
+          </a:ln>
+        </p:spPr>
+        <p:style>
+          <a:lnRef idx="1">
+            <a:schemeClr val="accent1"/>
+          </a:lnRef>
+          <a:fillRef idx="0">
+            <a:schemeClr val="accent1"/>
+          </a:fillRef>
+          <a:effectRef idx="0">
+            <a:schemeClr val="accent1"/>
+          </a:effectRef>
+          <a:fontRef idx="minor">
+            <a:schemeClr val="tx1"/>
+          </a:fontRef>
+        </p:style>
+        <p:txBody>
+          <a:bodyPr rtlCol="0" anchor="ctr"/>
+          <a:lstStyle/>
+          <a:p>
+            <a:pPr algn="ctr"/>
+            <a:endParaRPr lang="en-US">
+              <a:solidFill>
+                <a:srgbClr val="00B0F0"/>
+              </a:solidFill>
+            </a:endParaRPr>
+          </a:p>
+        </p:txBody>
+      </p:sp>
+      <p:sp>
+        <p:nvSpPr>
+          <p:cNvPr id="10" name="TextBox 9">
+            <a:extLst>
+              <a:ext uri="{FF2B5EF4-FFF2-40B4-BE49-F238E27FC236}">
+                <a16:creationId xmlns:a16="http://schemas.microsoft.com/office/drawing/2014/main" id="{81578FFE-EB6F-7BEF-4FA1-F78455DF51A0}"/>
+              </a:ext>
+            </a:extLst>
+          </p:cNvPr>
+          <p:cNvSpPr txBox="1"/>
+          <p:nvPr/>
+        </p:nvSpPr>
+        <p:spPr>
+          <a:xfrm>
+            <a:off x="4475349" y="3762455"/>
+            <a:ext cx="1364733" cy="369332"/>
+          </a:xfrm>
+          <a:prstGeom prst="rect">
+            <a:avLst/>
+          </a:prstGeom>
+          <a:noFill/>
+        </p:spPr>
+        <p:txBody>
+          <a:bodyPr wrap="none" rtlCol="0">
+            <a:spAutoFit/>
+          </a:bodyPr>
+          <a:lstStyle/>
+          <a:p>
+            <a:r>
+              <a:rPr lang="en-US" b="1" dirty="0">
+                <a:solidFill>
+                  <a:srgbClr val="00B0F0"/>
+                </a:solidFill>
+              </a:rPr>
+              <a:t>Update Step</a:t>
+            </a:r>
+          </a:p>
+        </p:txBody>
+      </p:sp>
+      <p:sp>
+        <p:nvSpPr>
+          <p:cNvPr id="11" name="Right Brace 10">
+            <a:extLst>
+              <a:ext uri="{FF2B5EF4-FFF2-40B4-BE49-F238E27FC236}">
+                <a16:creationId xmlns:a16="http://schemas.microsoft.com/office/drawing/2014/main" id="{B791DF07-98AF-EE6A-C30E-42C82F9D4A20}"/>
+              </a:ext>
+            </a:extLst>
+          </p:cNvPr>
+          <p:cNvSpPr/>
+          <p:nvPr/>
+        </p:nvSpPr>
+        <p:spPr>
+          <a:xfrm rot="16200000">
+            <a:off x="6258120" y="422229"/>
+            <a:ext cx="1283844" cy="3163615"/>
+          </a:xfrm>
+          <a:prstGeom prst="rightBrace">
+            <a:avLst/>
+          </a:prstGeom>
+          <a:ln w="38100">
+            <a:solidFill>
+              <a:srgbClr val="00B0F0"/>
+            </a:solidFill>
+          </a:ln>
+        </p:spPr>
+        <p:style>
+          <a:lnRef idx="1">
+            <a:schemeClr val="accent1"/>
+          </a:lnRef>
+          <a:fillRef idx="0">
+            <a:schemeClr val="accent1"/>
+          </a:fillRef>
+          <a:effectRef idx="0">
+            <a:schemeClr val="accent1"/>
+          </a:effectRef>
+          <a:fontRef idx="minor">
+            <a:schemeClr val="tx1"/>
+          </a:fontRef>
+        </p:style>
+        <p:txBody>
+          <a:bodyPr rtlCol="0" anchor="ctr"/>
+          <a:lstStyle/>
+          <a:p>
+            <a:pPr algn="ctr"/>
+            <a:endParaRPr lang="en-US">
+              <a:solidFill>
+                <a:srgbClr val="00B0F0"/>
+              </a:solidFill>
+            </a:endParaRPr>
+          </a:p>
+        </p:txBody>
+      </p:sp>
+      <p:sp>
+        <p:nvSpPr>
+          <p:cNvPr id="13" name="Right Brace 12">
+            <a:extLst>
+              <a:ext uri="{FF2B5EF4-FFF2-40B4-BE49-F238E27FC236}">
+                <a16:creationId xmlns:a16="http://schemas.microsoft.com/office/drawing/2014/main" id="{19AAD943-3C42-EAEA-3946-A9CBE4D2497D}"/>
+              </a:ext>
+            </a:extLst>
+          </p:cNvPr>
+          <p:cNvSpPr/>
+          <p:nvPr/>
+        </p:nvSpPr>
+        <p:spPr>
+          <a:xfrm rot="5400000">
+            <a:off x="8096564" y="1737557"/>
+            <a:ext cx="1095919" cy="2953876"/>
+          </a:xfrm>
+          <a:prstGeom prst="rightBrace">
+            <a:avLst/>
+          </a:prstGeom>
+          <a:ln w="38100">
+            <a:solidFill>
+              <a:srgbClr val="00B0F0"/>
+            </a:solidFill>
+          </a:ln>
+        </p:spPr>
+        <p:style>
+          <a:lnRef idx="1">
+            <a:schemeClr val="accent1"/>
+          </a:lnRef>
+          <a:fillRef idx="0">
+            <a:schemeClr val="accent1"/>
+          </a:fillRef>
+          <a:effectRef idx="0">
+            <a:schemeClr val="accent1"/>
+          </a:effectRef>
+          <a:fontRef idx="minor">
+            <a:schemeClr val="tx1"/>
+          </a:fontRef>
+        </p:style>
+        <p:txBody>
+          <a:bodyPr rtlCol="0" anchor="ctr"/>
+          <a:lstStyle/>
+          <a:p>
+            <a:pPr algn="ctr"/>
+            <a:endParaRPr lang="en-US">
+              <a:solidFill>
+                <a:srgbClr val="00B0F0"/>
+              </a:solidFill>
+            </a:endParaRPr>
+          </a:p>
+        </p:txBody>
+      </p:sp>
+      <p:sp>
+        <p:nvSpPr>
+          <p:cNvPr id="14" name="TextBox 13">
+            <a:extLst>
+              <a:ext uri="{FF2B5EF4-FFF2-40B4-BE49-F238E27FC236}">
+                <a16:creationId xmlns:a16="http://schemas.microsoft.com/office/drawing/2014/main" id="{ECD1BD65-4B15-A257-2F59-47844DD41F0C}"/>
+              </a:ext>
+            </a:extLst>
+          </p:cNvPr>
+          <p:cNvSpPr txBox="1"/>
+          <p:nvPr/>
+        </p:nvSpPr>
+        <p:spPr>
+          <a:xfrm>
+            <a:off x="6117825" y="999175"/>
+            <a:ext cx="1364733" cy="369332"/>
+          </a:xfrm>
+          <a:prstGeom prst="rect">
+            <a:avLst/>
+          </a:prstGeom>
+          <a:noFill/>
+        </p:spPr>
+        <p:txBody>
+          <a:bodyPr wrap="none" rtlCol="0">
+            <a:spAutoFit/>
+          </a:bodyPr>
+          <a:lstStyle/>
+          <a:p>
+            <a:r>
+              <a:rPr lang="en-US" b="1" dirty="0">
+                <a:solidFill>
+                  <a:srgbClr val="00B0F0"/>
+                </a:solidFill>
+              </a:rPr>
+              <a:t>Update Step</a:t>
+            </a:r>
+          </a:p>
+        </p:txBody>
+      </p:sp>
+      <p:sp>
+        <p:nvSpPr>
+          <p:cNvPr id="15" name="TextBox 14">
+            <a:extLst>
+              <a:ext uri="{FF2B5EF4-FFF2-40B4-BE49-F238E27FC236}">
+                <a16:creationId xmlns:a16="http://schemas.microsoft.com/office/drawing/2014/main" id="{EA3D2128-2C77-D476-F0EE-4D78ABBADC42}"/>
+              </a:ext>
+            </a:extLst>
+          </p:cNvPr>
+          <p:cNvSpPr txBox="1"/>
+          <p:nvPr/>
+        </p:nvSpPr>
+        <p:spPr>
+          <a:xfrm>
+            <a:off x="7962156" y="3783031"/>
+            <a:ext cx="1364733" cy="369332"/>
+          </a:xfrm>
+          <a:prstGeom prst="rect">
+            <a:avLst/>
+          </a:prstGeom>
+          <a:noFill/>
+        </p:spPr>
+        <p:txBody>
+          <a:bodyPr wrap="none" rtlCol="0">
+            <a:spAutoFit/>
+          </a:bodyPr>
+          <a:lstStyle/>
+          <a:p>
+            <a:r>
+              <a:rPr lang="en-US" b="1" dirty="0">
+                <a:solidFill>
+                  <a:srgbClr val="00B0F0"/>
+                </a:solidFill>
+              </a:rPr>
+              <a:t>Update Step</a:t>
+            </a:r>
+          </a:p>
+        </p:txBody>
+      </p:sp>
+    </p:spTree>
+    <p:extLst>
+      <p:ext uri="{BB962C8B-B14F-4D97-AF65-F5344CB8AC3E}">
+        <p14:creationId xmlns:p14="http://schemas.microsoft.com/office/powerpoint/2010/main" val="4246504345"/>
+      </p:ext>
+    </p:extLst>
+  </p:cSld>
+  <p:clrMapOvr>
+    <a:masterClrMapping/>
+  </p:clrMapOvr>
+</p:sld>
+</file>
+
 <file path=ppt/theme/theme1.xml><?xml version="1.0" encoding="utf-8"?>
 <a:theme xmlns:a="http://schemas.openxmlformats.org/drawingml/2006/main" name="Office 2013 - 2022 Theme">
   <a:themeElements>

</xml_diff>